<commit_message>
Finishing touches on the tutorial
</commit_message>
<xml_diff>
--- a/slides/Strategus.pptx
+++ b/slides/Strategus.pptx
@@ -5,7 +5,7 @@
     <p:sldMasterId id="2147483648" r:id="rId1"/>
   </p:sldMasterIdLst>
   <p:notesMasterIdLst>
-    <p:notesMasterId r:id="rId8"/>
+    <p:notesMasterId r:id="rId9"/>
   </p:notesMasterIdLst>
   <p:sldIdLst>
     <p:sldId id="15368039" r:id="rId2"/>
@@ -14,6 +14,7 @@
     <p:sldId id="1101" r:id="rId5"/>
     <p:sldId id="15368033" r:id="rId6"/>
     <p:sldId id="15368040" r:id="rId7"/>
+    <p:sldId id="268" r:id="rId8"/>
   </p:sldIdLst>
   <p:sldSz cx="12192000" cy="6858000"/>
   <p:notesSz cx="6858000" cy="9144000"/>
@@ -213,7 +214,7 @@
           <a:p>
             <a:fld id="{0CB52742-373F-4A87-92C3-F1BD6DE2FDEE}" type="datetimeFigureOut">
               <a:rPr lang="en-US" smtClean="0"/>
-              <a:t>5/27/24</a:t>
+              <a:t>5/29/24</a:t>
             </a:fld>
             <a:endParaRPr lang="en-US"/>
           </a:p>
@@ -2343,44 +2344,6 @@
               <a:rPr lang="en-US" dirty="0"/>
               <a:t>Automated execution of HADES packages</a:t>
             </a:r>
-          </a:p>
-        </p:txBody>
-      </p:sp>
-      <p:sp>
-        <p:nvSpPr>
-          <p:cNvPr id="4" name="Slide Number Placeholder 3">
-            <a:extLst>
-              <a:ext uri="{FF2B5EF4-FFF2-40B4-BE49-F238E27FC236}">
-                <a16:creationId xmlns:a16="http://schemas.microsoft.com/office/drawing/2014/main" id="{80BB5E06-2C85-C314-A06B-63E40FBE2BB7}"/>
-              </a:ext>
-            </a:extLst>
-          </p:cNvPr>
-          <p:cNvSpPr>
-            <a:spLocks noGrp="1"/>
-          </p:cNvSpPr>
-          <p:nvPr>
-            <p:ph type="sldNum" sz="quarter" idx="4294967295"/>
-          </p:nvPr>
-        </p:nvSpPr>
-        <p:spPr>
-          <a:xfrm>
-            <a:off x="9347200" y="6492875"/>
-            <a:ext cx="2844800" cy="365125"/>
-          </a:xfrm>
-          <a:prstGeom prst="rect">
-            <a:avLst/>
-          </a:prstGeom>
-        </p:spPr>
-        <p:txBody>
-          <a:bodyPr/>
-          <a:lstStyle/>
-          <a:p>
-            <a:fld id="{444583ED-F364-40B3-B25B-483B5033DFA3}" type="slidenum">
-              <a:rPr lang="en-US" smtClean="0"/>
-              <a:pPr/>
-              <a:t>1</a:t>
-            </a:fld>
-            <a:endParaRPr lang="en-US"/>
           </a:p>
         </p:txBody>
       </p:sp>
@@ -21097,6 +21060,119 @@
 </p:sld>
 </file>
 
+<file path=ppt/slides/slide7.xml><?xml version="1.0" encoding="utf-8"?>
+<p:sld xmlns:a="http://schemas.openxmlformats.org/drawingml/2006/main" xmlns:r="http://schemas.openxmlformats.org/officeDocument/2006/relationships" xmlns:p="http://schemas.openxmlformats.org/presentationml/2006/main">
+  <p:cSld>
+    <p:spTree>
+      <p:nvGrpSpPr>
+        <p:cNvPr id="1" name=""/>
+        <p:cNvGrpSpPr/>
+        <p:nvPr/>
+      </p:nvGrpSpPr>
+      <p:grpSpPr>
+        <a:xfrm>
+          <a:off x="0" y="0"/>
+          <a:ext cx="0" cy="0"/>
+          <a:chOff x="0" y="0"/>
+          <a:chExt cx="0" cy="0"/>
+        </a:xfrm>
+      </p:grpSpPr>
+      <p:sp>
+        <p:nvSpPr>
+          <p:cNvPr id="2" name="Title 1">
+            <a:extLst>
+              <a:ext uri="{FF2B5EF4-FFF2-40B4-BE49-F238E27FC236}">
+                <a16:creationId xmlns:a16="http://schemas.microsoft.com/office/drawing/2014/main" id="{7E3E9B8C-3CC1-C4C1-6C4B-E2AF88D22858}"/>
+              </a:ext>
+            </a:extLst>
+          </p:cNvPr>
+          <p:cNvSpPr>
+            <a:spLocks noGrp="1"/>
+          </p:cNvSpPr>
+          <p:nvPr>
+            <p:ph type="title"/>
+          </p:nvPr>
+        </p:nvSpPr>
+        <p:spPr/>
+        <p:txBody>
+          <a:bodyPr/>
+          <a:lstStyle/>
+          <a:p>
+            <a:r>
+              <a:rPr lang="en-US" dirty="0"/>
+              <a:t>Try it yourself!</a:t>
+            </a:r>
+          </a:p>
+        </p:txBody>
+      </p:sp>
+      <p:sp>
+        <p:nvSpPr>
+          <p:cNvPr id="3" name="Content Placeholder 2">
+            <a:extLst>
+              <a:ext uri="{FF2B5EF4-FFF2-40B4-BE49-F238E27FC236}">
+                <a16:creationId xmlns:a16="http://schemas.microsoft.com/office/drawing/2014/main" id="{D9F32460-2CF2-529E-07FE-2C382D0D597F}"/>
+              </a:ext>
+            </a:extLst>
+          </p:cNvPr>
+          <p:cNvSpPr>
+            <a:spLocks noGrp="1"/>
+          </p:cNvSpPr>
+          <p:nvPr>
+            <p:ph idx="1"/>
+          </p:nvPr>
+        </p:nvSpPr>
+        <p:spPr/>
+        <p:txBody>
+          <a:bodyPr/>
+          <a:lstStyle/>
+          <a:p>
+            <a:pPr marL="0" indent="0" algn="ctr">
+              <a:buNone/>
+            </a:pPr>
+            <a:r>
+              <a:rPr lang="en-US" dirty="0"/>
+              <a:t>Follow the instructions in the tutorial</a:t>
+            </a:r>
+          </a:p>
+          <a:p>
+            <a:pPr marL="0" indent="0" algn="ctr">
+              <a:buNone/>
+            </a:pPr>
+            <a:endParaRPr lang="en-US" dirty="0"/>
+          </a:p>
+          <a:p>
+            <a:pPr marL="0" indent="0" algn="ctr">
+              <a:buNone/>
+            </a:pPr>
+            <a:r>
+              <a:rPr lang="en-US" sz="3200" dirty="0">
+                <a:hlinkClick r:id="rId2"/>
+              </a:rPr>
+              <a:t>https://github.com/OHDSI/Tutorial-Hades</a:t>
+            </a:r>
+            <a:r>
+              <a:rPr lang="en-US" sz="3200" dirty="0"/>
+              <a:t> </a:t>
+            </a:r>
+          </a:p>
+          <a:p>
+            <a:endParaRPr lang="en-US" dirty="0"/>
+          </a:p>
+        </p:txBody>
+      </p:sp>
+    </p:spTree>
+    <p:extLst>
+      <p:ext uri="{BB962C8B-B14F-4D97-AF65-F5344CB8AC3E}">
+        <p14:creationId xmlns:p14="http://schemas.microsoft.com/office/powerpoint/2010/main" val="2579453455"/>
+      </p:ext>
+    </p:extLst>
+  </p:cSld>
+  <p:clrMapOvr>
+    <a:masterClrMapping/>
+  </p:clrMapOvr>
+</p:sld>
+</file>
+
 <file path=ppt/theme/theme1.xml><?xml version="1.0" encoding="utf-8"?>
 <a:theme xmlns:a="http://schemas.openxmlformats.org/drawingml/2006/main" name="Office Theme">
   <a:themeElements>

</xml_diff>